<commit_message>
manage grouped sp #97
</commit_message>
<xml_diff>
--- a/tests/testthat/docs_dir/table-complex.pptx
+++ b/tests/testthat/docs_dir/table-complex.pptx
@@ -6,6 +6,7 @@
   </p:sldMasterIdLst>
   <p:sldIdLst>
     <p:sldId id="256" r:id="rId2"/>
+    <p:sldId id="257" r:id="rId3"/>
   </p:sldIdLst>
   <p:sldSz cx="9144000" cy="6858000" type="screen4x3"/>
   <p:notesSz cx="6858000" cy="9144000"/>
@@ -288,7 +289,7 @@
           <a:p>
             <a:fld id="{83DD1AA2-79A4-FA4D-B14E-14BED1CACA69}" type="datetimeFigureOut">
               <a:rPr lang="fr-FR" smtClean="0"/>
-              <a:t>01/12/17</a:t>
+              <a:t>07/01/18</a:t>
             </a:fld>
             <a:endParaRPr lang="fr-FR"/>
           </a:p>
@@ -458,7 +459,7 @@
           <a:p>
             <a:fld id="{83DD1AA2-79A4-FA4D-B14E-14BED1CACA69}" type="datetimeFigureOut">
               <a:rPr lang="fr-FR" smtClean="0"/>
-              <a:t>01/12/17</a:t>
+              <a:t>07/01/18</a:t>
             </a:fld>
             <a:endParaRPr lang="fr-FR"/>
           </a:p>
@@ -638,7 +639,7 @@
           <a:p>
             <a:fld id="{83DD1AA2-79A4-FA4D-B14E-14BED1CACA69}" type="datetimeFigureOut">
               <a:rPr lang="fr-FR" smtClean="0"/>
-              <a:t>01/12/17</a:t>
+              <a:t>07/01/18</a:t>
             </a:fld>
             <a:endParaRPr lang="fr-FR"/>
           </a:p>
@@ -808,7 +809,7 @@
           <a:p>
             <a:fld id="{83DD1AA2-79A4-FA4D-B14E-14BED1CACA69}" type="datetimeFigureOut">
               <a:rPr lang="fr-FR" smtClean="0"/>
-              <a:t>01/12/17</a:t>
+              <a:t>07/01/18</a:t>
             </a:fld>
             <a:endParaRPr lang="fr-FR"/>
           </a:p>
@@ -1054,7 +1055,7 @@
           <a:p>
             <a:fld id="{83DD1AA2-79A4-FA4D-B14E-14BED1CACA69}" type="datetimeFigureOut">
               <a:rPr lang="fr-FR" smtClean="0"/>
-              <a:t>01/12/17</a:t>
+              <a:t>07/01/18</a:t>
             </a:fld>
             <a:endParaRPr lang="fr-FR"/>
           </a:p>
@@ -1342,7 +1343,7 @@
           <a:p>
             <a:fld id="{83DD1AA2-79A4-FA4D-B14E-14BED1CACA69}" type="datetimeFigureOut">
               <a:rPr lang="fr-FR" smtClean="0"/>
-              <a:t>01/12/17</a:t>
+              <a:t>07/01/18</a:t>
             </a:fld>
             <a:endParaRPr lang="fr-FR"/>
           </a:p>
@@ -1764,7 +1765,7 @@
           <a:p>
             <a:fld id="{83DD1AA2-79A4-FA4D-B14E-14BED1CACA69}" type="datetimeFigureOut">
               <a:rPr lang="fr-FR" smtClean="0"/>
-              <a:t>01/12/17</a:t>
+              <a:t>07/01/18</a:t>
             </a:fld>
             <a:endParaRPr lang="fr-FR"/>
           </a:p>
@@ -1882,7 +1883,7 @@
           <a:p>
             <a:fld id="{83DD1AA2-79A4-FA4D-B14E-14BED1CACA69}" type="datetimeFigureOut">
               <a:rPr lang="fr-FR" smtClean="0"/>
-              <a:t>01/12/17</a:t>
+              <a:t>07/01/18</a:t>
             </a:fld>
             <a:endParaRPr lang="fr-FR"/>
           </a:p>
@@ -1977,7 +1978,7 @@
           <a:p>
             <a:fld id="{83DD1AA2-79A4-FA4D-B14E-14BED1CACA69}" type="datetimeFigureOut">
               <a:rPr lang="fr-FR" smtClean="0"/>
-              <a:t>01/12/17</a:t>
+              <a:t>07/01/18</a:t>
             </a:fld>
             <a:endParaRPr lang="fr-FR"/>
           </a:p>
@@ -2254,7 +2255,7 @@
           <a:p>
             <a:fld id="{83DD1AA2-79A4-FA4D-B14E-14BED1CACA69}" type="datetimeFigureOut">
               <a:rPr lang="fr-FR" smtClean="0"/>
-              <a:t>01/12/17</a:t>
+              <a:t>07/01/18</a:t>
             </a:fld>
             <a:endParaRPr lang="fr-FR"/>
           </a:p>
@@ -2507,7 +2508,7 @@
           <a:p>
             <a:fld id="{83DD1AA2-79A4-FA4D-B14E-14BED1CACA69}" type="datetimeFigureOut">
               <a:rPr lang="fr-FR" smtClean="0"/>
-              <a:t>01/12/17</a:t>
+              <a:t>07/01/18</a:t>
             </a:fld>
             <a:endParaRPr lang="fr-FR"/>
           </a:p>
@@ -2720,7 +2721,7 @@
           <a:p>
             <a:fld id="{83DD1AA2-79A4-FA4D-B14E-14BED1CACA69}" type="datetimeFigureOut">
               <a:rPr lang="fr-FR" smtClean="0"/>
-              <a:t>01/12/17</a:t>
+              <a:t>07/01/18</a:t>
             </a:fld>
             <a:endParaRPr lang="fr-FR"/>
           </a:p>
@@ -3581,6 +3582,185 @@
 </p:sld>
 </file>
 
+<file path=ppt/slides/slide2.xml><?xml version="1.0" encoding="utf-8"?>
+<p:sld xmlns:a="http://schemas.openxmlformats.org/drawingml/2006/main" xmlns:r="http://schemas.openxmlformats.org/officeDocument/2006/relationships" xmlns:p="http://schemas.openxmlformats.org/presentationml/2006/main">
+  <p:cSld>
+    <p:spTree>
+      <p:nvGrpSpPr>
+        <p:cNvPr id="1" name=""/>
+        <p:cNvGrpSpPr/>
+        <p:nvPr/>
+      </p:nvGrpSpPr>
+      <p:grpSpPr>
+        <a:xfrm>
+          <a:off x="0" y="0"/>
+          <a:ext cx="0" cy="0"/>
+          <a:chOff x="0" y="0"/>
+          <a:chExt cx="0" cy="0"/>
+        </a:xfrm>
+      </p:grpSpPr>
+      <p:sp>
+        <p:nvSpPr>
+          <p:cNvPr id="7" name="Titre 1"/>
+          <p:cNvSpPr>
+            <a:spLocks noGrp="1"/>
+          </p:cNvSpPr>
+          <p:nvPr>
+            <p:ph type="title"/>
+          </p:nvPr>
+        </p:nvSpPr>
+        <p:spPr>
+          <a:xfrm>
+            <a:off x="838200" y="365125"/>
+            <a:ext cx="7771799" cy="1325563"/>
+          </a:xfrm>
+        </p:spPr>
+        <p:txBody>
+          <a:bodyPr/>
+          <a:lstStyle/>
+          <a:p>
+            <a:r>
+              <a:rPr lang="fr-FR" smtClean="0"/>
+              <a:t>coco</a:t>
+            </a:r>
+            <a:endParaRPr lang="fr-FR" dirty="0"/>
+          </a:p>
+        </p:txBody>
+      </p:sp>
+      <p:grpSp>
+        <p:nvGrpSpPr>
+          <p:cNvPr id="8" name="Group 7"/>
+          <p:cNvGrpSpPr/>
+          <p:nvPr/>
+        </p:nvGrpSpPr>
+        <p:grpSpPr>
+          <a:xfrm>
+            <a:off x="1611814" y="3878323"/>
+            <a:ext cx="6082277" cy="2125980"/>
+            <a:chOff x="457200" y="342900"/>
+            <a:chExt cx="8229600" cy="2125980"/>
+          </a:xfrm>
+        </p:grpSpPr>
+        <p:sp>
+          <p:nvSpPr>
+            <p:cNvPr id="9" name="Rectangle 8"/>
+            <p:cNvSpPr/>
+            <p:nvPr/>
+          </p:nvSpPr>
+          <p:spPr>
+            <a:xfrm>
+              <a:off x="2628900" y="1371600"/>
+              <a:ext cx="3886200" cy="1097280"/>
+            </a:xfrm>
+            <a:prstGeom prst="rect">
+              <a:avLst/>
+            </a:prstGeom>
+            <a:solidFill>
+              <a:schemeClr val="accent2"/>
+            </a:solidFill>
+            <a:ln w="12700" cap="sq" cmpd="sng" algn="ctr">
+              <a:noFill/>
+              <a:prstDash val="solid"/>
+            </a:ln>
+            <a:effectLst/>
+          </p:spPr>
+          <p:txBody>
+            <a:bodyPr lIns="182880" tIns="0" rIns="182880" bIns="0" rtlCol="0" anchor="ctr" anchorCtr="0"/>
+            <a:lstStyle/>
+            <a:p>
+              <a:pPr algn="ctr">
+                <a:spcAft>
+                  <a:spcPts val="300"/>
+                </a:spcAft>
+                <a:defRPr/>
+              </a:pPr>
+              <a:r>
+                <a:rPr lang="en-US" sz="900" b="1" kern="0" dirty="0" smtClean="0">
+                  <a:solidFill>
+                    <a:srgbClr val="FFFFFF"/>
+                  </a:solidFill>
+                </a:rPr>
+                <a:t>line of text</a:t>
+              </a:r>
+              <a:endParaRPr lang="en-US" sz="900" b="1" kern="0" dirty="0">
+                <a:solidFill>
+                  <a:srgbClr val="FFFFFF"/>
+                </a:solidFill>
+              </a:endParaRPr>
+            </a:p>
+            <a:p>
+              <a:pPr lvl="0" algn="ctr">
+                <a:spcAft>
+                  <a:spcPts val="300"/>
+                </a:spcAft>
+                <a:defRPr/>
+              </a:pPr>
+              <a:r>
+                <a:rPr lang="en-US" sz="900" kern="0" spc="-20" dirty="0" smtClean="0">
+                  <a:solidFill>
+                    <a:srgbClr val="FFFFFF"/>
+                  </a:solidFill>
+                </a:rPr>
+                <a:t>blah blah blah</a:t>
+              </a:r>
+              <a:endParaRPr lang="en-US" sz="900" kern="0" spc="-20" dirty="0">
+                <a:solidFill>
+                  <a:srgbClr val="FFFFFF"/>
+                </a:solidFill>
+              </a:endParaRPr>
+            </a:p>
+          </p:txBody>
+        </p:sp>
+        <p:cxnSp>
+          <p:nvCxnSpPr>
+            <p:cNvPr id="10" name="Straight Connector 11"/>
+            <p:cNvCxnSpPr/>
+            <p:nvPr/>
+          </p:nvCxnSpPr>
+          <p:spPr>
+            <a:xfrm>
+              <a:off x="457200" y="342900"/>
+              <a:ext cx="8229600" cy="0"/>
+            </a:xfrm>
+            <a:prstGeom prst="line">
+              <a:avLst/>
+            </a:prstGeom>
+            <a:ln>
+              <a:solidFill>
+                <a:schemeClr val="accent2"/>
+              </a:solidFill>
+              <a:prstDash val="dash"/>
+            </a:ln>
+          </p:spPr>
+          <p:style>
+            <a:lnRef idx="2">
+              <a:schemeClr val="accent1"/>
+            </a:lnRef>
+            <a:fillRef idx="0">
+              <a:schemeClr val="accent1"/>
+            </a:fillRef>
+            <a:effectRef idx="1">
+              <a:schemeClr val="accent1"/>
+            </a:effectRef>
+            <a:fontRef idx="minor">
+              <a:schemeClr val="tx1"/>
+            </a:fontRef>
+          </p:style>
+        </p:cxnSp>
+      </p:grpSp>
+    </p:spTree>
+    <p:extLst>
+      <p:ext uri="{BB962C8B-B14F-4D97-AF65-F5344CB8AC3E}">
+        <p14:creationId xmlns:p14="http://schemas.microsoft.com/office/powerpoint/2010/main" val="958833448"/>
+      </p:ext>
+    </p:extLst>
+  </p:cSld>
+  <p:clrMapOvr>
+    <a:masterClrMapping/>
+  </p:clrMapOvr>
+</p:sld>
+</file>
+
 <file path=ppt/theme/theme1.xml><?xml version="1.0" encoding="utf-8"?>
 <a:theme xmlns:a="http://schemas.openxmlformats.org/drawingml/2006/main" name="My Theme">
   <a:themeElements>

</xml_diff>